<commit_message>
Atualiza balanceador de carga
</commit_message>
<xml_diff>
--- a/2.2-distributed-websocket/load-balancer.pptx
+++ b/2.2-distributed-websocket/load-balancer.pptx
@@ -10733,21 +10733,30 @@
                             </p:childTnLst>
                           </p:cTn>
                         </p:par>
+                      </p:childTnLst>
+                    </p:cTn>
+                  </p:par>
+                  <p:par>
+                    <p:cTn id="16" fill="hold">
+                      <p:stCondLst>
+                        <p:cond delay="indefinite"/>
+                      </p:stCondLst>
+                      <p:childTnLst>
                         <p:par>
-                          <p:cTn id="16" fill="hold">
+                          <p:cTn id="17" fill="hold">
                             <p:stCondLst>
-                              <p:cond delay="1000"/>
+                              <p:cond delay="0"/>
                             </p:stCondLst>
                             <p:childTnLst>
                               <p:par>
-                                <p:cTn id="17" presetID="17" presetClass="entr" presetSubtype="1" fill="hold" nodeType="afterEffect">
+                                <p:cTn id="18" presetID="17" presetClass="entr" presetSubtype="1" fill="hold" nodeType="clickEffect">
                                   <p:stCondLst>
                                     <p:cond delay="0"/>
                                   </p:stCondLst>
                                   <p:childTnLst>
                                     <p:set>
                                       <p:cBhvr>
-                                        <p:cTn id="18" dur="1" fill="hold">
+                                        <p:cTn id="19" dur="1" fill="hold">
                                           <p:stCondLst>
                                             <p:cond delay="0"/>
                                           </p:stCondLst>
@@ -10765,7 +10774,7 @@
                                     </p:set>
                                     <p:anim calcmode="lin" valueType="num">
                                       <p:cBhvr>
-                                        <p:cTn id="19" dur="500" fill="hold"/>
+                                        <p:cTn id="20" dur="500" fill="hold"/>
                                         <p:tgtEl>
                                           <p:spTgt spid="26"/>
                                         </p:tgtEl>
@@ -10788,7 +10797,7 @@
                                     </p:anim>
                                     <p:anim calcmode="lin" valueType="num">
                                       <p:cBhvr>
-                                        <p:cTn id="20" dur="500" fill="hold"/>
+                                        <p:cTn id="21" dur="500" fill="hold"/>
                                         <p:tgtEl>
                                           <p:spTgt spid="26"/>
                                         </p:tgtEl>
@@ -10811,7 +10820,7 @@
                                     </p:anim>
                                     <p:anim calcmode="lin" valueType="num">
                                       <p:cBhvr>
-                                        <p:cTn id="21" dur="500" fill="hold"/>
+                                        <p:cTn id="22" dur="500" fill="hold"/>
                                         <p:tgtEl>
                                           <p:spTgt spid="26"/>
                                         </p:tgtEl>
@@ -10834,7 +10843,7 @@
                                     </p:anim>
                                     <p:anim calcmode="lin" valueType="num">
                                       <p:cBhvr>
-                                        <p:cTn id="22" dur="500" fill="hold"/>
+                                        <p:cTn id="23" dur="500" fill="hold"/>
                                         <p:tgtEl>
                                           <p:spTgt spid="26"/>
                                         </p:tgtEl>
@@ -12115,21 +12124,30 @@
                             </p:childTnLst>
                           </p:cTn>
                         </p:par>
+                      </p:childTnLst>
+                    </p:cTn>
+                  </p:par>
+                  <p:par>
+                    <p:cTn id="16" fill="hold">
+                      <p:stCondLst>
+                        <p:cond delay="indefinite"/>
+                      </p:stCondLst>
+                      <p:childTnLst>
                         <p:par>
-                          <p:cTn id="16" fill="hold">
+                          <p:cTn id="17" fill="hold">
                             <p:stCondLst>
-                              <p:cond delay="1000"/>
+                              <p:cond delay="0"/>
                             </p:stCondLst>
                             <p:childTnLst>
                               <p:par>
-                                <p:cTn id="17" presetID="17" presetClass="entr" presetSubtype="1" fill="hold" nodeType="afterEffect">
+                                <p:cTn id="18" presetID="17" presetClass="entr" presetSubtype="1" fill="hold" nodeType="clickEffect">
                                   <p:stCondLst>
                                     <p:cond delay="0"/>
                                   </p:stCondLst>
                                   <p:childTnLst>
                                     <p:set>
                                       <p:cBhvr>
-                                        <p:cTn id="18" dur="1" fill="hold">
+                                        <p:cTn id="19" dur="1" fill="hold">
                                           <p:stCondLst>
                                             <p:cond delay="0"/>
                                           </p:stCondLst>
@@ -12147,7 +12165,7 @@
                                     </p:set>
                                     <p:anim calcmode="lin" valueType="num">
                                       <p:cBhvr>
-                                        <p:cTn id="19" dur="500" fill="hold"/>
+                                        <p:cTn id="20" dur="500" fill="hold"/>
                                         <p:tgtEl>
                                           <p:spTgt spid="22"/>
                                         </p:tgtEl>
@@ -12170,7 +12188,7 @@
                                     </p:anim>
                                     <p:anim calcmode="lin" valueType="num">
                                       <p:cBhvr>
-                                        <p:cTn id="20" dur="500" fill="hold"/>
+                                        <p:cTn id="21" dur="500" fill="hold"/>
                                         <p:tgtEl>
                                           <p:spTgt spid="22"/>
                                         </p:tgtEl>
@@ -12193,7 +12211,7 @@
                                     </p:anim>
                                     <p:anim calcmode="lin" valueType="num">
                                       <p:cBhvr>
-                                        <p:cTn id="21" dur="500" fill="hold"/>
+                                        <p:cTn id="22" dur="500" fill="hold"/>
                                         <p:tgtEl>
                                           <p:spTgt spid="22"/>
                                         </p:tgtEl>
@@ -12216,7 +12234,7 @@
                                     </p:anim>
                                     <p:anim calcmode="lin" valueType="num">
                                       <p:cBhvr>
-                                        <p:cTn id="22" dur="500" fill="hold"/>
+                                        <p:cTn id="23" dur="500" fill="hold"/>
                                         <p:tgtEl>
                                           <p:spTgt spid="22"/>
                                         </p:tgtEl>
@@ -13559,21 +13577,30 @@
                             </p:childTnLst>
                           </p:cTn>
                         </p:par>
+                      </p:childTnLst>
+                    </p:cTn>
+                  </p:par>
+                  <p:par>
+                    <p:cTn id="16" fill="hold">
+                      <p:stCondLst>
+                        <p:cond delay="indefinite"/>
+                      </p:stCondLst>
+                      <p:childTnLst>
                         <p:par>
-                          <p:cTn id="16" fill="hold">
+                          <p:cTn id="17" fill="hold">
                             <p:stCondLst>
-                              <p:cond delay="1000"/>
+                              <p:cond delay="0"/>
                             </p:stCondLst>
                             <p:childTnLst>
                               <p:par>
-                                <p:cTn id="17" presetID="17" presetClass="entr" presetSubtype="1" fill="hold" nodeType="afterEffect">
+                                <p:cTn id="18" presetID="17" presetClass="entr" presetSubtype="1" fill="hold" nodeType="clickEffect">
                                   <p:stCondLst>
                                     <p:cond delay="0"/>
                                   </p:stCondLst>
                                   <p:childTnLst>
                                     <p:set>
                                       <p:cBhvr>
-                                        <p:cTn id="18" dur="1" fill="hold">
+                                        <p:cTn id="19" dur="1" fill="hold">
                                           <p:stCondLst>
                                             <p:cond delay="0"/>
                                           </p:stCondLst>
@@ -13591,7 +13618,7 @@
                                     </p:set>
                                     <p:anim calcmode="lin" valueType="num">
                                       <p:cBhvr>
-                                        <p:cTn id="19" dur="500" fill="hold"/>
+                                        <p:cTn id="20" dur="500" fill="hold"/>
                                         <p:tgtEl>
                                           <p:spTgt spid="22"/>
                                         </p:tgtEl>
@@ -13614,7 +13641,7 @@
                                     </p:anim>
                                     <p:anim calcmode="lin" valueType="num">
                                       <p:cBhvr>
-                                        <p:cTn id="20" dur="500" fill="hold"/>
+                                        <p:cTn id="21" dur="500" fill="hold"/>
                                         <p:tgtEl>
                                           <p:spTgt spid="22"/>
                                         </p:tgtEl>
@@ -13637,7 +13664,7 @@
                                     </p:anim>
                                     <p:anim calcmode="lin" valueType="num">
                                       <p:cBhvr>
-                                        <p:cTn id="21" dur="500" fill="hold"/>
+                                        <p:cTn id="22" dur="500" fill="hold"/>
                                         <p:tgtEl>
                                           <p:spTgt spid="22"/>
                                         </p:tgtEl>
@@ -13660,7 +13687,7 @@
                                     </p:anim>
                                     <p:anim calcmode="lin" valueType="num">
                                       <p:cBhvr>
-                                        <p:cTn id="22" dur="500" fill="hold"/>
+                                        <p:cTn id="23" dur="500" fill="hold"/>
                                         <p:tgtEl>
                                           <p:spTgt spid="22"/>
                                         </p:tgtEl>

</xml_diff>